<commit_message>
(Debug) Release Error (Change) Android Prjct to Release
</commit_message>
<xml_diff>
--- a/ICON.pptx
+++ b/ICON.pptx
@@ -6,6 +6,7 @@
   </p:sldMasterIdLst>
   <p:sldIdLst>
     <p:sldId id="256" r:id="rId2"/>
+    <p:sldId id="257" r:id="rId3"/>
   </p:sldIdLst>
   <p:sldSz cx="35999738" cy="35999738"/>
   <p:notesSz cx="6858000" cy="9144000"/>
@@ -243,7 +244,7 @@
           <a:p>
             <a:fld id="{9EE5ED0B-9483-449D-B082-AECAD61AE2CF}" type="datetimeFigureOut">
               <a:rPr lang="ko-KR" altLang="en-US" smtClean="0"/>
-              <a:t>2018-06-17</a:t>
+              <a:t>2018-07-05</a:t>
             </a:fld>
             <a:endParaRPr lang="ko-KR" altLang="en-US"/>
           </a:p>
@@ -413,7 +414,7 @@
           <a:p>
             <a:fld id="{9EE5ED0B-9483-449D-B082-AECAD61AE2CF}" type="datetimeFigureOut">
               <a:rPr lang="ko-KR" altLang="en-US" smtClean="0"/>
-              <a:t>2018-06-17</a:t>
+              <a:t>2018-07-05</a:t>
             </a:fld>
             <a:endParaRPr lang="ko-KR" altLang="en-US"/>
           </a:p>
@@ -593,7 +594,7 @@
           <a:p>
             <a:fld id="{9EE5ED0B-9483-449D-B082-AECAD61AE2CF}" type="datetimeFigureOut">
               <a:rPr lang="ko-KR" altLang="en-US" smtClean="0"/>
-              <a:t>2018-06-17</a:t>
+              <a:t>2018-07-05</a:t>
             </a:fld>
             <a:endParaRPr lang="ko-KR" altLang="en-US"/>
           </a:p>
@@ -763,7 +764,7 @@
           <a:p>
             <a:fld id="{9EE5ED0B-9483-449D-B082-AECAD61AE2CF}" type="datetimeFigureOut">
               <a:rPr lang="ko-KR" altLang="en-US" smtClean="0"/>
-              <a:t>2018-06-17</a:t>
+              <a:t>2018-07-05</a:t>
             </a:fld>
             <a:endParaRPr lang="ko-KR" altLang="en-US"/>
           </a:p>
@@ -1007,7 +1008,7 @@
           <a:p>
             <a:fld id="{9EE5ED0B-9483-449D-B082-AECAD61AE2CF}" type="datetimeFigureOut">
               <a:rPr lang="ko-KR" altLang="en-US" smtClean="0"/>
-              <a:t>2018-06-17</a:t>
+              <a:t>2018-07-05</a:t>
             </a:fld>
             <a:endParaRPr lang="ko-KR" altLang="en-US"/>
           </a:p>
@@ -1239,7 +1240,7 @@
           <a:p>
             <a:fld id="{9EE5ED0B-9483-449D-B082-AECAD61AE2CF}" type="datetimeFigureOut">
               <a:rPr lang="ko-KR" altLang="en-US" smtClean="0"/>
-              <a:t>2018-06-17</a:t>
+              <a:t>2018-07-05</a:t>
             </a:fld>
             <a:endParaRPr lang="ko-KR" altLang="en-US"/>
           </a:p>
@@ -1606,7 +1607,7 @@
           <a:p>
             <a:fld id="{9EE5ED0B-9483-449D-B082-AECAD61AE2CF}" type="datetimeFigureOut">
               <a:rPr lang="ko-KR" altLang="en-US" smtClean="0"/>
-              <a:t>2018-06-17</a:t>
+              <a:t>2018-07-05</a:t>
             </a:fld>
             <a:endParaRPr lang="ko-KR" altLang="en-US"/>
           </a:p>
@@ -1724,7 +1725,7 @@
           <a:p>
             <a:fld id="{9EE5ED0B-9483-449D-B082-AECAD61AE2CF}" type="datetimeFigureOut">
               <a:rPr lang="ko-KR" altLang="en-US" smtClean="0"/>
-              <a:t>2018-06-17</a:t>
+              <a:t>2018-07-05</a:t>
             </a:fld>
             <a:endParaRPr lang="ko-KR" altLang="en-US"/>
           </a:p>
@@ -1819,7 +1820,7 @@
           <a:p>
             <a:fld id="{9EE5ED0B-9483-449D-B082-AECAD61AE2CF}" type="datetimeFigureOut">
               <a:rPr lang="ko-KR" altLang="en-US" smtClean="0"/>
-              <a:t>2018-06-17</a:t>
+              <a:t>2018-07-05</a:t>
             </a:fld>
             <a:endParaRPr lang="ko-KR" altLang="en-US"/>
           </a:p>
@@ -2096,7 +2097,7 @@
           <a:p>
             <a:fld id="{9EE5ED0B-9483-449D-B082-AECAD61AE2CF}" type="datetimeFigureOut">
               <a:rPr lang="ko-KR" altLang="en-US" smtClean="0"/>
-              <a:t>2018-06-17</a:t>
+              <a:t>2018-07-05</a:t>
             </a:fld>
             <a:endParaRPr lang="ko-KR" altLang="en-US"/>
           </a:p>
@@ -2353,7 +2354,7 @@
           <a:p>
             <a:fld id="{9EE5ED0B-9483-449D-B082-AECAD61AE2CF}" type="datetimeFigureOut">
               <a:rPr lang="ko-KR" altLang="en-US" smtClean="0"/>
-              <a:t>2018-06-17</a:t>
+              <a:t>2018-07-05</a:t>
             </a:fld>
             <a:endParaRPr lang="ko-KR" altLang="en-US"/>
           </a:p>
@@ -2571,7 +2572,7 @@
           <a:p>
             <a:fld id="{9EE5ED0B-9483-449D-B082-AECAD61AE2CF}" type="datetimeFigureOut">
               <a:rPr lang="ko-KR" altLang="en-US" smtClean="0"/>
-              <a:t>2018-06-17</a:t>
+              <a:t>2018-07-05</a:t>
             </a:fld>
             <a:endParaRPr lang="ko-KR" altLang="en-US"/>
           </a:p>
@@ -3299,6 +3300,370 @@
 </p:sld>
 </file>
 
+<file path=ppt/slides/slide2.xml><?xml version="1.0" encoding="utf-8"?>
+<p:sld xmlns:a="http://schemas.openxmlformats.org/drawingml/2006/main" xmlns:r="http://schemas.openxmlformats.org/officeDocument/2006/relationships" xmlns:p="http://schemas.openxmlformats.org/presentationml/2006/main">
+  <p:cSld>
+    <p:spTree>
+      <p:nvGrpSpPr>
+        <p:cNvPr id="1" name=""/>
+        <p:cNvGrpSpPr/>
+        <p:nvPr/>
+      </p:nvGrpSpPr>
+      <p:grpSpPr>
+        <a:xfrm>
+          <a:off x="0" y="0"/>
+          <a:ext cx="0" cy="0"/>
+          <a:chOff x="0" y="0"/>
+          <a:chExt cx="0" cy="0"/>
+        </a:xfrm>
+      </p:grpSpPr>
+      <p:sp>
+        <p:nvSpPr>
+          <p:cNvPr id="2" name="사각형: 둥근 모서리 1">
+            <a:extLst>
+              <a:ext uri="{FF2B5EF4-FFF2-40B4-BE49-F238E27FC236}">
+                <a16:creationId xmlns:a16="http://schemas.microsoft.com/office/drawing/2014/main" id="{21131F56-63D6-4CAA-A703-9007BF5ECCF5}"/>
+              </a:ext>
+            </a:extLst>
+          </p:cNvPr>
+          <p:cNvSpPr/>
+          <p:nvPr/>
+        </p:nvSpPr>
+        <p:spPr>
+          <a:xfrm>
+            <a:off x="1800000" y="1800000"/>
+            <a:ext cx="32400000" cy="32400000"/>
+          </a:xfrm>
+          <a:prstGeom prst="roundRect">
+            <a:avLst/>
+          </a:prstGeom>
+          <a:solidFill>
+            <a:schemeClr val="accent4">
+              <a:lumMod val="60000"/>
+              <a:lumOff val="40000"/>
+            </a:schemeClr>
+          </a:solidFill>
+          <a:ln w="2540000">
+            <a:solidFill>
+              <a:schemeClr val="accent1">
+                <a:lumMod val="60000"/>
+                <a:lumOff val="40000"/>
+              </a:schemeClr>
+            </a:solidFill>
+          </a:ln>
+        </p:spPr>
+        <p:style>
+          <a:lnRef idx="2">
+            <a:schemeClr val="accent1">
+              <a:shade val="50000"/>
+            </a:schemeClr>
+          </a:lnRef>
+          <a:fillRef idx="1">
+            <a:schemeClr val="accent1"/>
+          </a:fillRef>
+          <a:effectRef idx="0">
+            <a:schemeClr val="accent1"/>
+          </a:effectRef>
+          <a:fontRef idx="minor">
+            <a:schemeClr val="lt1"/>
+          </a:fontRef>
+        </p:style>
+        <p:txBody>
+          <a:bodyPr rtlCol="0" anchor="ctr"/>
+          <a:lstStyle/>
+          <a:p>
+            <a:pPr algn="ctr"/>
+            <a:endParaRPr lang="ko-KR" altLang="en-US"/>
+          </a:p>
+        </p:txBody>
+      </p:sp>
+      <p:sp>
+        <p:nvSpPr>
+          <p:cNvPr id="3" name="TextBox 2">
+            <a:extLst>
+              <a:ext uri="{FF2B5EF4-FFF2-40B4-BE49-F238E27FC236}">
+                <a16:creationId xmlns:a16="http://schemas.microsoft.com/office/drawing/2014/main" id="{405E4FE0-E4CE-4CE8-925E-30E0FDCFDF04}"/>
+              </a:ext>
+            </a:extLst>
+          </p:cNvPr>
+          <p:cNvSpPr txBox="1"/>
+          <p:nvPr/>
+        </p:nvSpPr>
+        <p:spPr>
+          <a:xfrm>
+            <a:off x="4523874" y="17179694"/>
+            <a:ext cx="29020168" cy="17020044"/>
+          </a:xfrm>
+          <a:prstGeom prst="rect">
+            <a:avLst/>
+          </a:prstGeom>
+          <a:noFill/>
+        </p:spPr>
+        <p:txBody>
+          <a:bodyPr wrap="square" rtlCol="0">
+            <a:spAutoFit/>
+          </a:bodyPr>
+          <a:lstStyle/>
+          <a:p>
+            <a:r>
+              <a:rPr lang="en-US" altLang="ko-KR" sz="110000" b="1" dirty="0">
+                <a:solidFill>
+                  <a:schemeClr val="bg2">
+                    <a:lumMod val="25000"/>
+                  </a:schemeClr>
+                </a:solidFill>
+              </a:rPr>
+              <a:t>IASA</a:t>
+            </a:r>
+            <a:endParaRPr lang="ko-KR" altLang="en-US" sz="110000" b="1" dirty="0">
+              <a:solidFill>
+                <a:schemeClr val="bg2">
+                  <a:lumMod val="25000"/>
+                </a:schemeClr>
+              </a:solidFill>
+            </a:endParaRPr>
+          </a:p>
+        </p:txBody>
+      </p:sp>
+      <p:sp>
+        <p:nvSpPr>
+          <p:cNvPr id="4" name="사각형: 둥근 모서리 3">
+            <a:extLst>
+              <a:ext uri="{FF2B5EF4-FFF2-40B4-BE49-F238E27FC236}">
+                <a16:creationId xmlns:a16="http://schemas.microsoft.com/office/drawing/2014/main" id="{AA2DFE65-945A-4B73-B16F-3FBAB870251B}"/>
+              </a:ext>
+            </a:extLst>
+          </p:cNvPr>
+          <p:cNvSpPr/>
+          <p:nvPr/>
+        </p:nvSpPr>
+        <p:spPr>
+          <a:xfrm>
+            <a:off x="11117179" y="6400799"/>
+            <a:ext cx="20790568" cy="2935705"/>
+          </a:xfrm>
+          <a:prstGeom prst="roundRect">
+            <a:avLst>
+              <a:gd name="adj" fmla="val 50000"/>
+            </a:avLst>
+          </a:prstGeom>
+          <a:solidFill>
+            <a:schemeClr val="accent1">
+              <a:lumMod val="20000"/>
+              <a:lumOff val="80000"/>
+            </a:schemeClr>
+          </a:solidFill>
+          <a:ln>
+            <a:noFill/>
+          </a:ln>
+        </p:spPr>
+        <p:style>
+          <a:lnRef idx="2">
+            <a:schemeClr val="accent1">
+              <a:shade val="50000"/>
+            </a:schemeClr>
+          </a:lnRef>
+          <a:fillRef idx="1">
+            <a:schemeClr val="accent1"/>
+          </a:fillRef>
+          <a:effectRef idx="0">
+            <a:schemeClr val="accent1"/>
+          </a:effectRef>
+          <a:fontRef idx="minor">
+            <a:schemeClr val="lt1"/>
+          </a:fontRef>
+        </p:style>
+        <p:txBody>
+          <a:bodyPr rtlCol="0" anchor="ctr"/>
+          <a:lstStyle/>
+          <a:p>
+            <a:pPr algn="ctr"/>
+            <a:endParaRPr lang="ko-KR" altLang="en-US"/>
+          </a:p>
+        </p:txBody>
+      </p:sp>
+      <p:sp>
+        <p:nvSpPr>
+          <p:cNvPr id="5" name="타원 4">
+            <a:extLst>
+              <a:ext uri="{FF2B5EF4-FFF2-40B4-BE49-F238E27FC236}">
+                <a16:creationId xmlns:a16="http://schemas.microsoft.com/office/drawing/2014/main" id="{A1924DDF-817F-47FC-95AD-5A0986FC4CF9}"/>
+              </a:ext>
+            </a:extLst>
+          </p:cNvPr>
+          <p:cNvSpPr/>
+          <p:nvPr/>
+        </p:nvSpPr>
+        <p:spPr>
+          <a:xfrm>
+            <a:off x="4523874" y="3898230"/>
+            <a:ext cx="13475995" cy="7940841"/>
+          </a:xfrm>
+          <a:prstGeom prst="ellipse">
+            <a:avLst/>
+          </a:prstGeom>
+          <a:solidFill>
+            <a:schemeClr val="accent1">
+              <a:lumMod val="20000"/>
+              <a:lumOff val="80000"/>
+            </a:schemeClr>
+          </a:solidFill>
+          <a:ln>
+            <a:noFill/>
+          </a:ln>
+        </p:spPr>
+        <p:style>
+          <a:lnRef idx="2">
+            <a:schemeClr val="accent1">
+              <a:shade val="50000"/>
+            </a:schemeClr>
+          </a:lnRef>
+          <a:fillRef idx="1">
+            <a:schemeClr val="accent1"/>
+          </a:fillRef>
+          <a:effectRef idx="0">
+            <a:schemeClr val="accent1"/>
+          </a:effectRef>
+          <a:fontRef idx="minor">
+            <a:schemeClr val="lt1"/>
+          </a:fontRef>
+        </p:style>
+        <p:txBody>
+          <a:bodyPr rtlCol="0" anchor="ctr"/>
+          <a:lstStyle/>
+          <a:p>
+            <a:pPr algn="ctr"/>
+            <a:endParaRPr lang="ko-KR" altLang="en-US"/>
+          </a:p>
+        </p:txBody>
+      </p:sp>
+      <p:sp>
+        <p:nvSpPr>
+          <p:cNvPr id="6" name="사각형: 둥근 모서리 5">
+            <a:extLst>
+              <a:ext uri="{FF2B5EF4-FFF2-40B4-BE49-F238E27FC236}">
+                <a16:creationId xmlns:a16="http://schemas.microsoft.com/office/drawing/2014/main" id="{343CA3D6-33B2-4356-8365-28EDBF9F93C9}"/>
+              </a:ext>
+            </a:extLst>
+          </p:cNvPr>
+          <p:cNvSpPr/>
+          <p:nvPr/>
+        </p:nvSpPr>
+        <p:spPr>
+          <a:xfrm>
+            <a:off x="4523874" y="12469449"/>
+            <a:ext cx="27383873" cy="1872192"/>
+          </a:xfrm>
+          <a:prstGeom prst="roundRect">
+            <a:avLst>
+              <a:gd name="adj" fmla="val 50000"/>
+            </a:avLst>
+          </a:prstGeom>
+          <a:solidFill>
+            <a:schemeClr val="accent1">
+              <a:lumMod val="20000"/>
+              <a:lumOff val="80000"/>
+            </a:schemeClr>
+          </a:solidFill>
+          <a:ln>
+            <a:noFill/>
+          </a:ln>
+        </p:spPr>
+        <p:style>
+          <a:lnRef idx="2">
+            <a:schemeClr val="accent1">
+              <a:shade val="50000"/>
+            </a:schemeClr>
+          </a:lnRef>
+          <a:fillRef idx="1">
+            <a:schemeClr val="accent1"/>
+          </a:fillRef>
+          <a:effectRef idx="0">
+            <a:schemeClr val="accent1"/>
+          </a:effectRef>
+          <a:fontRef idx="minor">
+            <a:schemeClr val="lt1"/>
+          </a:fontRef>
+        </p:style>
+        <p:txBody>
+          <a:bodyPr rtlCol="0" anchor="ctr"/>
+          <a:lstStyle/>
+          <a:p>
+            <a:pPr algn="ctr"/>
+            <a:endParaRPr lang="ko-KR" altLang="en-US"/>
+          </a:p>
+        </p:txBody>
+      </p:sp>
+      <p:sp>
+        <p:nvSpPr>
+          <p:cNvPr id="7" name="사각형: 둥근 모서리 6">
+            <a:extLst>
+              <a:ext uri="{FF2B5EF4-FFF2-40B4-BE49-F238E27FC236}">
+                <a16:creationId xmlns:a16="http://schemas.microsoft.com/office/drawing/2014/main" id="{0E378EC0-E9DA-4D31-8D63-3D07E741DD88}"/>
+              </a:ext>
+            </a:extLst>
+          </p:cNvPr>
+          <p:cNvSpPr/>
+          <p:nvPr/>
+        </p:nvSpPr>
+        <p:spPr>
+          <a:xfrm>
+            <a:off x="4307932" y="15307240"/>
+            <a:ext cx="27383873" cy="1872192"/>
+          </a:xfrm>
+          <a:prstGeom prst="roundRect">
+            <a:avLst>
+              <a:gd name="adj" fmla="val 50000"/>
+            </a:avLst>
+          </a:prstGeom>
+          <a:solidFill>
+            <a:schemeClr val="accent1">
+              <a:lumMod val="20000"/>
+              <a:lumOff val="80000"/>
+            </a:schemeClr>
+          </a:solidFill>
+          <a:ln>
+            <a:noFill/>
+          </a:ln>
+        </p:spPr>
+        <p:style>
+          <a:lnRef idx="2">
+            <a:schemeClr val="accent1">
+              <a:shade val="50000"/>
+            </a:schemeClr>
+          </a:lnRef>
+          <a:fillRef idx="1">
+            <a:schemeClr val="accent1"/>
+          </a:fillRef>
+          <a:effectRef idx="0">
+            <a:schemeClr val="accent1"/>
+          </a:effectRef>
+          <a:fontRef idx="minor">
+            <a:schemeClr val="lt1"/>
+          </a:fontRef>
+        </p:style>
+        <p:txBody>
+          <a:bodyPr rtlCol="0" anchor="ctr"/>
+          <a:lstStyle/>
+          <a:p>
+            <a:pPr algn="ctr"/>
+            <a:endParaRPr lang="ko-KR" altLang="en-US"/>
+          </a:p>
+        </p:txBody>
+      </p:sp>
+    </p:spTree>
+    <p:extLst>
+      <p:ext uri="{BB962C8B-B14F-4D97-AF65-F5344CB8AC3E}">
+        <p14:creationId xmlns:p14="http://schemas.microsoft.com/office/powerpoint/2010/main" val="2616040023"/>
+      </p:ext>
+    </p:extLst>
+  </p:cSld>
+  <p:clrMapOvr>
+    <a:masterClrMapping/>
+  </p:clrMapOvr>
+</p:sld>
+</file>
+
 <file path=ppt/theme/theme1.xml><?xml version="1.0" encoding="utf-8"?>
 <a:theme xmlns:a="http://schemas.openxmlformats.org/drawingml/2006/main" name="Office 테마">
   <a:themeElements>

</xml_diff>